<commit_message>
add lint for ngrx
</commit_message>
<xml_diff>
--- a/NgRx/NGRX Part 2.pptx
+++ b/NgRx/NGRX Part 2.pptx
@@ -15,6 +15,8 @@
     <p:sldId id="263" r:id="rId9"/>
     <p:sldId id="264" r:id="rId10"/>
     <p:sldId id="265" r:id="rId11"/>
+    <p:sldId id="267" r:id="rId12"/>
+    <p:sldId id="266" r:id="rId13"/>
   </p:sldIdLst>
   <p:sldSz cx="12192000" cy="6858000"/>
   <p:notesSz cx="6858000" cy="9144000"/>
@@ -623,7 +625,7 @@
           <a:p>
             <a:fld id="{B5DB2D11-B6C9-434A-BD02-01E188E3A433}" type="datetimeFigureOut">
               <a:rPr lang="en-US" smtClean="0"/>
-              <a:t>7/31/2019</a:t>
+              <a:t>8/4/2019</a:t>
             </a:fld>
             <a:endParaRPr lang="en-US"/>
           </a:p>
@@ -919,7 +921,7 @@
           <a:p>
             <a:fld id="{B5DB2D11-B6C9-434A-BD02-01E188E3A433}" type="datetimeFigureOut">
               <a:rPr lang="en-US" smtClean="0"/>
-              <a:t>7/31/2019</a:t>
+              <a:t>8/4/2019</a:t>
             </a:fld>
             <a:endParaRPr lang="en-US"/>
           </a:p>
@@ -1167,7 +1169,7 @@
           <a:p>
             <a:fld id="{B5DB2D11-B6C9-434A-BD02-01E188E3A433}" type="datetimeFigureOut">
               <a:rPr lang="en-US" smtClean="0"/>
-              <a:t>7/31/2019</a:t>
+              <a:t>8/4/2019</a:t>
             </a:fld>
             <a:endParaRPr lang="en-US"/>
           </a:p>
@@ -1707,7 +1709,7 @@
           <a:p>
             <a:fld id="{B5DB2D11-B6C9-434A-BD02-01E188E3A433}" type="datetimeFigureOut">
               <a:rPr lang="en-US" smtClean="0"/>
-              <a:t>7/31/2019</a:t>
+              <a:t>8/4/2019</a:t>
             </a:fld>
             <a:endParaRPr lang="en-US"/>
           </a:p>
@@ -1955,7 +1957,7 @@
           <a:p>
             <a:fld id="{B5DB2D11-B6C9-434A-BD02-01E188E3A433}" type="datetimeFigureOut">
               <a:rPr lang="en-US" smtClean="0"/>
-              <a:t>7/31/2019</a:t>
+              <a:t>8/4/2019</a:t>
             </a:fld>
             <a:endParaRPr lang="en-US"/>
           </a:p>
@@ -2487,7 +2489,7 @@
           <a:p>
             <a:fld id="{B5DB2D11-B6C9-434A-BD02-01E188E3A433}" type="datetimeFigureOut">
               <a:rPr lang="en-US" smtClean="0"/>
-              <a:t>7/31/2019</a:t>
+              <a:t>8/4/2019</a:t>
             </a:fld>
             <a:endParaRPr lang="en-US"/>
           </a:p>
@@ -2784,7 +2786,7 @@
           <a:p>
             <a:fld id="{B5DB2D11-B6C9-434A-BD02-01E188E3A433}" type="datetimeFigureOut">
               <a:rPr lang="en-US" smtClean="0"/>
-              <a:t>7/31/2019</a:t>
+              <a:t>8/4/2019</a:t>
             </a:fld>
             <a:endParaRPr lang="en-US"/>
           </a:p>
@@ -2958,7 +2960,7 @@
           <a:p>
             <a:fld id="{B5DB2D11-B6C9-434A-BD02-01E188E3A433}" type="datetimeFigureOut">
               <a:rPr lang="en-US" smtClean="0"/>
-              <a:t>7/31/2019</a:t>
+              <a:t>8/4/2019</a:t>
             </a:fld>
             <a:endParaRPr lang="en-US"/>
           </a:p>
@@ -3138,7 +3140,7 @@
           <a:p>
             <a:fld id="{B5DB2D11-B6C9-434A-BD02-01E188E3A433}" type="datetimeFigureOut">
               <a:rPr lang="en-US" smtClean="0"/>
-              <a:t>7/31/2019</a:t>
+              <a:t>8/4/2019</a:t>
             </a:fld>
             <a:endParaRPr lang="en-US"/>
           </a:p>
@@ -3308,7 +3310,7 @@
           <a:p>
             <a:fld id="{B5DB2D11-B6C9-434A-BD02-01E188E3A433}" type="datetimeFigureOut">
               <a:rPr lang="en-US" smtClean="0"/>
-              <a:t>7/31/2019</a:t>
+              <a:t>8/4/2019</a:t>
             </a:fld>
             <a:endParaRPr lang="en-US"/>
           </a:p>
@@ -3559,7 +3561,7 @@
           <a:p>
             <a:fld id="{B5DB2D11-B6C9-434A-BD02-01E188E3A433}" type="datetimeFigureOut">
               <a:rPr lang="en-US" smtClean="0"/>
-              <a:t>7/31/2019</a:t>
+              <a:t>8/4/2019</a:t>
             </a:fld>
             <a:endParaRPr lang="en-US"/>
           </a:p>
@@ -3856,7 +3858,7 @@
           <a:p>
             <a:fld id="{B5DB2D11-B6C9-434A-BD02-01E188E3A433}" type="datetimeFigureOut">
               <a:rPr lang="en-US" smtClean="0"/>
-              <a:t>7/31/2019</a:t>
+              <a:t>8/4/2019</a:t>
             </a:fld>
             <a:endParaRPr lang="en-US"/>
           </a:p>
@@ -4298,7 +4300,7 @@
           <a:p>
             <a:fld id="{B5DB2D11-B6C9-434A-BD02-01E188E3A433}" type="datetimeFigureOut">
               <a:rPr lang="en-US" smtClean="0"/>
-              <a:t>7/31/2019</a:t>
+              <a:t>8/4/2019</a:t>
             </a:fld>
             <a:endParaRPr lang="en-US"/>
           </a:p>
@@ -4416,7 +4418,7 @@
           <a:p>
             <a:fld id="{B5DB2D11-B6C9-434A-BD02-01E188E3A433}" type="datetimeFigureOut">
               <a:rPr lang="en-US" smtClean="0"/>
-              <a:t>7/31/2019</a:t>
+              <a:t>8/4/2019</a:t>
             </a:fld>
             <a:endParaRPr lang="en-US"/>
           </a:p>
@@ -4511,7 +4513,7 @@
           <a:p>
             <a:fld id="{B5DB2D11-B6C9-434A-BD02-01E188E3A433}" type="datetimeFigureOut">
               <a:rPr lang="en-US" smtClean="0"/>
-              <a:t>7/31/2019</a:t>
+              <a:t>8/4/2019</a:t>
             </a:fld>
             <a:endParaRPr lang="en-US"/>
           </a:p>
@@ -4794,7 +4796,7 @@
           <a:p>
             <a:fld id="{B5DB2D11-B6C9-434A-BD02-01E188E3A433}" type="datetimeFigureOut">
               <a:rPr lang="en-US" smtClean="0"/>
-              <a:t>7/31/2019</a:t>
+              <a:t>8/4/2019</a:t>
             </a:fld>
             <a:endParaRPr lang="en-US"/>
           </a:p>
@@ -5085,7 +5087,7 @@
           <a:p>
             <a:fld id="{B5DB2D11-B6C9-434A-BD02-01E188E3A433}" type="datetimeFigureOut">
               <a:rPr lang="en-US" smtClean="0"/>
-              <a:t>7/31/2019</a:t>
+              <a:t>8/4/2019</a:t>
             </a:fld>
             <a:endParaRPr lang="en-US"/>
           </a:p>
@@ -5615,7 +5617,7 @@
           <a:p>
             <a:fld id="{B5DB2D11-B6C9-434A-BD02-01E188E3A433}" type="datetimeFigureOut">
               <a:rPr lang="en-US" smtClean="0"/>
-              <a:t>7/31/2019</a:t>
+              <a:t>8/4/2019</a:t>
             </a:fld>
             <a:endParaRPr lang="en-US"/>
           </a:p>
@@ -6261,7 +6263,7 @@
           <p:cNvPr id="2" name="Title 1">
             <a:extLst>
               <a:ext uri="{FF2B5EF4-FFF2-40B4-BE49-F238E27FC236}">
-                <a16:creationId xmlns:a16="http://schemas.microsoft.com/office/drawing/2014/main" id="{4D1AE969-FC54-467C-93D4-710B61526748}"/>
+                <a16:creationId xmlns:a16="http://schemas.microsoft.com/office/drawing/2014/main" xmlns="" id="{4D1AE969-FC54-467C-93D4-710B61526748}"/>
               </a:ext>
             </a:extLst>
           </p:cNvPr>
@@ -6280,7 +6282,7 @@
           <a:lstStyle/>
           <a:p>
             <a:r>
-              <a:rPr lang="nl-NL" sz="5500" dirty="0">
+              <a:rPr lang="nl-NL" sz="5500" dirty="0" smtClean="0">
                 <a:latin typeface="Times New Roman" panose="02020603050405020304" pitchFamily="18" charset="0"/>
                 <a:cs typeface="Times New Roman" panose="02020603050405020304" pitchFamily="18" charset="0"/>
               </a:rPr>
@@ -6295,7 +6297,7 @@
           <p:cNvPr id="3" name="Content Placeholder 2">
             <a:extLst>
               <a:ext uri="{FF2B5EF4-FFF2-40B4-BE49-F238E27FC236}">
-                <a16:creationId xmlns:a16="http://schemas.microsoft.com/office/drawing/2014/main" id="{AAA1DD82-151F-4594-AE11-4E1C5630642E}"/>
+                <a16:creationId xmlns:a16="http://schemas.microsoft.com/office/drawing/2014/main" xmlns="" id="{AAA1DD82-151F-4594-AE11-4E1C5630642E}"/>
               </a:ext>
             </a:extLst>
           </p:cNvPr>
@@ -6314,49 +6316,25 @@
           <a:lstStyle/>
           <a:p>
             <a:r>
-              <a:rPr lang="en-US" sz="2600" dirty="0">
+              <a:rPr lang="en-US" sz="2600" smtClean="0">
                 <a:latin typeface="Times New Roman" panose="02020603050405020304" pitchFamily="18" charset="0"/>
                 <a:cs typeface="Times New Roman" panose="02020603050405020304" pitchFamily="18" charset="0"/>
               </a:rPr>
-              <a:t>Scaffolding library for Angular applications using </a:t>
-            </a:r>
-            <a:r>
-              <a:rPr lang="en-US" sz="2600" dirty="0" err="1">
+              <a:t>Scaffolding library for Angular applications using NgRx libraries.</a:t>
+            </a:r>
+          </a:p>
+          <a:p>
+            <a:r>
+              <a:rPr lang="en-US" sz="2600" smtClean="0">
                 <a:latin typeface="Times New Roman" panose="02020603050405020304" pitchFamily="18" charset="0"/>
                 <a:cs typeface="Times New Roman" panose="02020603050405020304" pitchFamily="18" charset="0"/>
               </a:rPr>
-              <a:t>NgRx</a:t>
-            </a:r>
-            <a:r>
-              <a:rPr lang="en-US" sz="2600" dirty="0">
-                <a:latin typeface="Times New Roman" panose="02020603050405020304" pitchFamily="18" charset="0"/>
-                <a:cs typeface="Times New Roman" panose="02020603050405020304" pitchFamily="18" charset="0"/>
-              </a:rPr>
-              <a:t> libraries.</a:t>
-            </a:r>
-          </a:p>
-          <a:p>
-            <a:r>
-              <a:rPr lang="en-US" sz="2600" dirty="0">
-                <a:latin typeface="Times New Roman" panose="02020603050405020304" pitchFamily="18" charset="0"/>
-                <a:cs typeface="Times New Roman" panose="02020603050405020304" pitchFamily="18" charset="0"/>
-              </a:rPr>
-              <a:t>Schematics provides Angular CLI commands for generating files when building new </a:t>
-            </a:r>
-            <a:r>
-              <a:rPr lang="en-US" sz="2600" dirty="0" err="1">
-                <a:latin typeface="Times New Roman" panose="02020603050405020304" pitchFamily="18" charset="0"/>
-                <a:cs typeface="Times New Roman" panose="02020603050405020304" pitchFamily="18" charset="0"/>
-              </a:rPr>
-              <a:t>NgRx</a:t>
-            </a:r>
-            <a:r>
-              <a:rPr lang="en-US" sz="2600" dirty="0">
-                <a:latin typeface="Times New Roman" panose="02020603050405020304" pitchFamily="18" charset="0"/>
-                <a:cs typeface="Times New Roman" panose="02020603050405020304" pitchFamily="18" charset="0"/>
-              </a:rPr>
-              <a:t> feature areas and expanding existing ones. Built on top of Schematics, this tool integrates with the Angular CLI.</a:t>
-            </a:r>
+              <a:t>Schematics provides Angular CLI commands for generating files when building new NgRx feature areas and expanding existing ones. Built on top of Schematics, this tool integrates with the Angular CLI.</a:t>
+            </a:r>
+            <a:endParaRPr lang="en-US" sz="2600" dirty="0">
+              <a:latin typeface="Times New Roman" panose="02020603050405020304" pitchFamily="18" charset="0"/>
+              <a:cs typeface="Times New Roman" panose="02020603050405020304" pitchFamily="18" charset="0"/>
+            </a:endParaRPr>
           </a:p>
         </p:txBody>
       </p:sp>
@@ -6370,6 +6348,838 @@
   <p:clrMapOvr>
     <a:masterClrMapping/>
   </p:clrMapOvr>
+  <p:timing>
+    <p:tnLst>
+      <p:par>
+        <p:cTn id="1" dur="indefinite" restart="never" nodeType="tmRoot"/>
+      </p:par>
+    </p:tnLst>
+  </p:timing>
+</p:sld>
+</file>
+
+<file path=ppt/slides/slide11.xml><?xml version="1.0" encoding="utf-8"?>
+<p:sld xmlns:a="http://schemas.openxmlformats.org/drawingml/2006/main" xmlns:r="http://schemas.openxmlformats.org/officeDocument/2006/relationships" xmlns:p="http://schemas.openxmlformats.org/presentationml/2006/main">
+  <p:cSld>
+    <p:spTree>
+      <p:nvGrpSpPr>
+        <p:cNvPr id="1" name=""/>
+        <p:cNvGrpSpPr/>
+        <p:nvPr/>
+      </p:nvGrpSpPr>
+      <p:grpSpPr>
+        <a:xfrm>
+          <a:off x="0" y="0"/>
+          <a:ext cx="0" cy="0"/>
+          <a:chOff x="0" y="0"/>
+          <a:chExt cx="0" cy="0"/>
+        </a:xfrm>
+      </p:grpSpPr>
+      <p:sp>
+        <p:nvSpPr>
+          <p:cNvPr id="2" name="Title 1"/>
+          <p:cNvSpPr>
+            <a:spLocks noGrp="1"/>
+          </p:cNvSpPr>
+          <p:nvPr>
+            <p:ph type="title"/>
+          </p:nvPr>
+        </p:nvSpPr>
+        <p:spPr/>
+        <p:txBody>
+          <a:bodyPr>
+            <a:normAutofit/>
+          </a:bodyPr>
+          <a:lstStyle/>
+          <a:p>
+            <a:r>
+              <a:rPr lang="en-US" sz="5500" dirty="0" smtClean="0">
+                <a:latin typeface="Times New Roman" panose="02020603050405020304" pitchFamily="18" charset="0"/>
+                <a:cs typeface="Times New Roman" panose="02020603050405020304" pitchFamily="18" charset="0"/>
+              </a:rPr>
+              <a:t>What is good </a:t>
+            </a:r>
+            <a:r>
+              <a:rPr lang="en-US" sz="5500" dirty="0">
+                <a:latin typeface="Times New Roman" panose="02020603050405020304" pitchFamily="18" charset="0"/>
+                <a:cs typeface="Times New Roman" panose="02020603050405020304" pitchFamily="18" charset="0"/>
+              </a:rPr>
+              <a:t>action </a:t>
+            </a:r>
+            <a:r>
+              <a:rPr lang="en-US" sz="5500" dirty="0" smtClean="0">
+                <a:latin typeface="Times New Roman" panose="02020603050405020304" pitchFamily="18" charset="0"/>
+                <a:cs typeface="Times New Roman" panose="02020603050405020304" pitchFamily="18" charset="0"/>
+              </a:rPr>
+              <a:t>hygiene ?</a:t>
+            </a:r>
+            <a:endParaRPr lang="en-US" sz="5500" dirty="0">
+              <a:latin typeface="Times New Roman" panose="02020603050405020304" pitchFamily="18" charset="0"/>
+              <a:cs typeface="Times New Roman" panose="02020603050405020304" pitchFamily="18" charset="0"/>
+            </a:endParaRPr>
+          </a:p>
+        </p:txBody>
+      </p:sp>
+      <p:sp>
+        <p:nvSpPr>
+          <p:cNvPr id="3" name="Content Placeholder 2"/>
+          <p:cNvSpPr>
+            <a:spLocks noGrp="1"/>
+          </p:cNvSpPr>
+          <p:nvPr>
+            <p:ph idx="1"/>
+          </p:nvPr>
+        </p:nvSpPr>
+        <p:spPr>
+          <a:xfrm>
+            <a:off x="1484310" y="2242867"/>
+            <a:ext cx="10018713" cy="3548333"/>
+          </a:xfrm>
+        </p:spPr>
+        <p:txBody>
+          <a:bodyPr>
+            <a:normAutofit/>
+          </a:bodyPr>
+          <a:lstStyle/>
+          <a:p>
+            <a:r>
+              <a:rPr lang="nl-NL" dirty="0" smtClean="0"/>
+              <a:t>Action that </a:t>
+            </a:r>
+            <a:r>
+              <a:rPr lang="en-US" dirty="0"/>
+              <a:t>follow the "[Source] Event" </a:t>
+            </a:r>
+            <a:r>
+              <a:rPr lang="en-US" dirty="0" smtClean="0"/>
+              <a:t>convention</a:t>
+            </a:r>
+          </a:p>
+          <a:p>
+            <a:r>
+              <a:rPr lang="nl-NL" dirty="0" smtClean="0"/>
+              <a:t>Example</a:t>
+            </a:r>
+          </a:p>
+          <a:p>
+            <a:endParaRPr lang="nl-NL" dirty="0"/>
+          </a:p>
+          <a:p>
+            <a:pPr marL="0" indent="0">
+              <a:buNone/>
+            </a:pPr>
+            <a:endParaRPr lang="nl-NL" dirty="0" smtClean="0"/>
+          </a:p>
+          <a:p>
+            <a:endParaRPr lang="nl-NL" dirty="0" smtClean="0"/>
+          </a:p>
+        </p:txBody>
+      </p:sp>
+      <p:pic>
+        <p:nvPicPr>
+          <p:cNvPr id="7" name="Picture 6"/>
+          <p:cNvPicPr>
+            <a:picLocks noChangeAspect="1"/>
+          </p:cNvPicPr>
+          <p:nvPr/>
+        </p:nvPicPr>
+        <p:blipFill>
+          <a:blip r:embed="rId2">
+            <a:extLst>
+              <a:ext uri="{28A0092B-C50C-407E-A947-70E740481C1C}">
+                <a14:useLocalDpi xmlns:a14="http://schemas.microsoft.com/office/drawing/2010/main" val="0"/>
+              </a:ext>
+            </a:extLst>
+          </a:blip>
+          <a:stretch>
+            <a:fillRect/>
+          </a:stretch>
+        </p:blipFill>
+        <p:spPr>
+          <a:xfrm>
+            <a:off x="1565620" y="3995466"/>
+            <a:ext cx="10058400" cy="2365079"/>
+          </a:xfrm>
+          <a:prstGeom prst="rect">
+            <a:avLst/>
+          </a:prstGeom>
+        </p:spPr>
+      </p:pic>
+    </p:spTree>
+    <p:extLst>
+      <p:ext uri="{BB962C8B-B14F-4D97-AF65-F5344CB8AC3E}">
+        <p14:creationId xmlns:p14="http://schemas.microsoft.com/office/powerpoint/2010/main" val="780228986"/>
+      </p:ext>
+    </p:extLst>
+  </p:cSld>
+  <p:clrMapOvr>
+    <a:masterClrMapping/>
+  </p:clrMapOvr>
+  <p:timing>
+    <p:tnLst>
+      <p:par>
+        <p:cTn id="1" dur="indefinite" restart="never" nodeType="tmRoot"/>
+      </p:par>
+    </p:tnLst>
+  </p:timing>
+</p:sld>
+</file>
+
+<file path=ppt/slides/slide12.xml><?xml version="1.0" encoding="utf-8"?>
+<p:sld xmlns:a="http://schemas.openxmlformats.org/drawingml/2006/main" xmlns:r="http://schemas.openxmlformats.org/officeDocument/2006/relationships" xmlns:p="http://schemas.openxmlformats.org/presentationml/2006/main">
+  <p:cSld>
+    <p:spTree>
+      <p:nvGrpSpPr>
+        <p:cNvPr id="1" name=""/>
+        <p:cNvGrpSpPr/>
+        <p:nvPr/>
+      </p:nvGrpSpPr>
+      <p:grpSpPr>
+        <a:xfrm>
+          <a:off x="0" y="0"/>
+          <a:ext cx="0" cy="0"/>
+          <a:chOff x="0" y="0"/>
+          <a:chExt cx="0" cy="0"/>
+        </a:xfrm>
+      </p:grpSpPr>
+      <p:sp>
+        <p:nvSpPr>
+          <p:cNvPr id="2" name="Title 1"/>
+          <p:cNvSpPr>
+            <a:spLocks noGrp="1"/>
+          </p:cNvSpPr>
+          <p:nvPr>
+            <p:ph type="title"/>
+          </p:nvPr>
+        </p:nvSpPr>
+        <p:spPr/>
+        <p:txBody>
+          <a:bodyPr>
+            <a:noAutofit/>
+          </a:bodyPr>
+          <a:lstStyle/>
+          <a:p>
+            <a:r>
+              <a:rPr lang="en-US" sz="5500" dirty="0" err="1" smtClean="0">
+                <a:latin typeface="Times New Roman" panose="02020603050405020304" pitchFamily="18" charset="0"/>
+                <a:cs typeface="Times New Roman" panose="02020603050405020304" pitchFamily="18" charset="0"/>
+              </a:rPr>
+              <a:t>TSLint</a:t>
+            </a:r>
+            <a:r>
+              <a:rPr lang="en-US" sz="5500" dirty="0" smtClean="0">
+                <a:latin typeface="Times New Roman" panose="02020603050405020304" pitchFamily="18" charset="0"/>
+                <a:cs typeface="Times New Roman" panose="02020603050405020304" pitchFamily="18" charset="0"/>
+              </a:rPr>
+              <a:t> rules for </a:t>
+            </a:r>
+            <a:r>
+              <a:rPr lang="en-US" sz="5500" dirty="0" err="1" smtClean="0">
+                <a:latin typeface="Times New Roman" panose="02020603050405020304" pitchFamily="18" charset="0"/>
+                <a:cs typeface="Times New Roman" panose="02020603050405020304" pitchFamily="18" charset="0"/>
+              </a:rPr>
+              <a:t>NgRx</a:t>
+            </a:r>
+            <a:r>
+              <a:rPr lang="nl-NL" sz="5500" dirty="0" smtClean="0">
+                <a:latin typeface="Times New Roman" panose="02020603050405020304" pitchFamily="18" charset="0"/>
+                <a:cs typeface="Times New Roman" panose="02020603050405020304" pitchFamily="18" charset="0"/>
+              </a:rPr>
+              <a:t/>
+            </a:r>
+            <a:br>
+              <a:rPr lang="nl-NL" sz="5500" dirty="0" smtClean="0">
+                <a:latin typeface="Times New Roman" panose="02020603050405020304" pitchFamily="18" charset="0"/>
+                <a:cs typeface="Times New Roman" panose="02020603050405020304" pitchFamily="18" charset="0"/>
+              </a:rPr>
+            </a:br>
+            <a:endParaRPr lang="en-US" sz="5500" dirty="0">
+              <a:latin typeface="Times New Roman" panose="02020603050405020304" pitchFamily="18" charset="0"/>
+              <a:cs typeface="Times New Roman" panose="02020603050405020304" pitchFamily="18" charset="0"/>
+            </a:endParaRPr>
+          </a:p>
+        </p:txBody>
+      </p:sp>
+      <p:graphicFrame>
+        <p:nvGraphicFramePr>
+          <p:cNvPr id="4" name="Content Placeholder 3"/>
+          <p:cNvGraphicFramePr>
+            <a:graphicFrameLocks noGrp="1"/>
+          </p:cNvGraphicFramePr>
+          <p:nvPr>
+            <p:ph idx="1"/>
+            <p:extLst>
+              <p:ext uri="{D42A27DB-BD31-4B8C-83A1-F6EECF244321}">
+                <p14:modId xmlns:p14="http://schemas.microsoft.com/office/powerpoint/2010/main" val="3043745359"/>
+              </p:ext>
+            </p:extLst>
+          </p:nvPr>
+        </p:nvGraphicFramePr>
+        <p:xfrm>
+          <a:off x="1484313" y="2667000"/>
+          <a:ext cx="8805908" cy="3217222"/>
+        </p:xfrm>
+        <a:graphic>
+          <a:graphicData uri="http://schemas.openxmlformats.org/drawingml/2006/table">
+            <a:tbl>
+              <a:tblPr/>
+              <a:tblGrid>
+                <a:gridCol w="4402954"/>
+                <a:gridCol w="4402954"/>
+              </a:tblGrid>
+              <a:tr h="471489">
+                <a:tc>
+                  <a:txBody>
+                    <a:bodyPr/>
+                    <a:lstStyle/>
+                    <a:p>
+                      <a:r>
+                        <a:rPr lang="en-US" u="none" strike="noStrike" dirty="0" err="1" smtClean="0">
+                          <a:solidFill>
+                            <a:schemeClr val="bg1"/>
+                          </a:solidFill>
+                          <a:effectLst/>
+                        </a:rPr>
+                        <a:t>ngrx</a:t>
+                      </a:r>
+                      <a:r>
+                        <a:rPr lang="en-US" u="none" strike="noStrike" dirty="0" smtClean="0">
+                          <a:solidFill>
+                            <a:schemeClr val="bg1"/>
+                          </a:solidFill>
+                          <a:effectLst/>
+                        </a:rPr>
+                        <a:t>-action-hygiene</a:t>
+                      </a:r>
+                      <a:endParaRPr lang="en-US" dirty="0">
+                        <a:solidFill>
+                          <a:schemeClr val="bg1"/>
+                        </a:solidFill>
+                        <a:effectLst/>
+                      </a:endParaRPr>
+                    </a:p>
+                  </a:txBody>
+                  <a:tcPr marL="123825" marR="123825" marT="57150" marB="57150" anchor="ctr">
+                    <a:lnL w="9525" cap="flat" cmpd="sng" algn="ctr">
+                      <a:solidFill>
+                        <a:srgbClr val="DFE2E5"/>
+                      </a:solidFill>
+                      <a:prstDash val="solid"/>
+                      <a:round/>
+                      <a:headEnd type="none" w="med" len="med"/>
+                      <a:tailEnd type="none" w="med" len="med"/>
+                    </a:lnL>
+                    <a:lnR w="9525" cap="flat" cmpd="sng" algn="ctr">
+                      <a:solidFill>
+                        <a:srgbClr val="DFE2E5"/>
+                      </a:solidFill>
+                      <a:prstDash val="solid"/>
+                      <a:round/>
+                      <a:headEnd type="none" w="med" len="med"/>
+                      <a:tailEnd type="none" w="med" len="med"/>
+                    </a:lnR>
+                    <a:lnT w="9525" cap="flat" cmpd="sng" algn="ctr">
+                      <a:solidFill>
+                        <a:srgbClr val="DFE2E5"/>
+                      </a:solidFill>
+                      <a:prstDash val="solid"/>
+                      <a:round/>
+                      <a:headEnd type="none" w="med" len="med"/>
+                      <a:tailEnd type="none" w="med" len="med"/>
+                    </a:lnT>
+                    <a:lnB w="9525" cap="flat" cmpd="sng" algn="ctr">
+                      <a:solidFill>
+                        <a:srgbClr val="DFE2E5"/>
+                      </a:solidFill>
+                      <a:prstDash val="solid"/>
+                      <a:round/>
+                      <a:headEnd type="none" w="med" len="med"/>
+                      <a:tailEnd type="none" w="med" len="med"/>
+                    </a:lnB>
+                    <a:solidFill>
+                      <a:srgbClr val="141414"/>
+                    </a:solidFill>
+                  </a:tcPr>
+                </a:tc>
+                <a:tc>
+                  <a:txBody>
+                    <a:bodyPr/>
+                    <a:lstStyle/>
+                    <a:p>
+                      <a:r>
+                        <a:rPr lang="en-US" dirty="0">
+                          <a:solidFill>
+                            <a:schemeClr val="bg1"/>
+                          </a:solidFill>
+                          <a:effectLst/>
+                        </a:rPr>
+                        <a:t>Enforces the use of good action hygiene</a:t>
+                      </a:r>
+                    </a:p>
+                  </a:txBody>
+                  <a:tcPr marL="123825" marR="123825" marT="57150" marB="57150" anchor="ctr">
+                    <a:lnL w="9525" cap="flat" cmpd="sng" algn="ctr">
+                      <a:solidFill>
+                        <a:srgbClr val="DFE2E5"/>
+                      </a:solidFill>
+                      <a:prstDash val="solid"/>
+                      <a:round/>
+                      <a:headEnd type="none" w="med" len="med"/>
+                      <a:tailEnd type="none" w="med" len="med"/>
+                    </a:lnL>
+                    <a:lnR w="9525" cap="flat" cmpd="sng" algn="ctr">
+                      <a:solidFill>
+                        <a:srgbClr val="DFE2E5"/>
+                      </a:solidFill>
+                      <a:prstDash val="solid"/>
+                      <a:round/>
+                      <a:headEnd type="none" w="med" len="med"/>
+                      <a:tailEnd type="none" w="med" len="med"/>
+                    </a:lnR>
+                    <a:lnT w="9525" cap="flat" cmpd="sng" algn="ctr">
+                      <a:solidFill>
+                        <a:srgbClr val="DFE2E5"/>
+                      </a:solidFill>
+                      <a:prstDash val="solid"/>
+                      <a:round/>
+                      <a:headEnd type="none" w="med" len="med"/>
+                      <a:tailEnd type="none" w="med" len="med"/>
+                    </a:lnT>
+                    <a:lnB w="9525" cap="flat" cmpd="sng" algn="ctr">
+                      <a:solidFill>
+                        <a:srgbClr val="DFE2E5"/>
+                      </a:solidFill>
+                      <a:prstDash val="solid"/>
+                      <a:round/>
+                      <a:headEnd type="none" w="med" len="med"/>
+                      <a:tailEnd type="none" w="med" len="med"/>
+                    </a:lnB>
+                    <a:solidFill>
+                      <a:srgbClr val="141414"/>
+                    </a:solidFill>
+                  </a:tcPr>
+                </a:tc>
+              </a:tr>
+              <a:tr h="1469938">
+                <a:tc>
+                  <a:txBody>
+                    <a:bodyPr/>
+                    <a:lstStyle/>
+                    <a:p>
+                      <a:r>
+                        <a:rPr lang="en-US" u="none" strike="noStrike" dirty="0" err="1" smtClean="0">
+                          <a:solidFill>
+                            <a:schemeClr val="bg1"/>
+                          </a:solidFill>
+                          <a:effectLst/>
+                        </a:rPr>
+                        <a:t>ngrx</a:t>
+                      </a:r>
+                      <a:r>
+                        <a:rPr lang="en-US" u="none" strike="noStrike" dirty="0" smtClean="0">
+                          <a:solidFill>
+                            <a:schemeClr val="bg1"/>
+                          </a:solidFill>
+                          <a:effectLst/>
+                        </a:rPr>
+                        <a:t>-effect-creator-and-decorator</a:t>
+                      </a:r>
+                      <a:endParaRPr lang="en-US" dirty="0">
+                        <a:solidFill>
+                          <a:schemeClr val="bg1"/>
+                        </a:solidFill>
+                        <a:effectLst/>
+                      </a:endParaRPr>
+                    </a:p>
+                  </a:txBody>
+                  <a:tcPr marL="123825" marR="123825" marT="57150" marB="57150" anchor="ctr">
+                    <a:lnL w="9525" cap="flat" cmpd="sng" algn="ctr">
+                      <a:solidFill>
+                        <a:srgbClr val="DFE2E5"/>
+                      </a:solidFill>
+                      <a:prstDash val="solid"/>
+                      <a:round/>
+                      <a:headEnd type="none" w="med" len="med"/>
+                      <a:tailEnd type="none" w="med" len="med"/>
+                    </a:lnL>
+                    <a:lnR w="9525" cap="flat" cmpd="sng" algn="ctr">
+                      <a:solidFill>
+                        <a:srgbClr val="DFE2E5"/>
+                      </a:solidFill>
+                      <a:prstDash val="solid"/>
+                      <a:round/>
+                      <a:headEnd type="none" w="med" len="med"/>
+                      <a:tailEnd type="none" w="med" len="med"/>
+                    </a:lnR>
+                    <a:lnT w="9525" cap="flat" cmpd="sng" algn="ctr">
+                      <a:solidFill>
+                        <a:srgbClr val="DFE2E5"/>
+                      </a:solidFill>
+                      <a:prstDash val="solid"/>
+                      <a:round/>
+                      <a:headEnd type="none" w="med" len="med"/>
+                      <a:tailEnd type="none" w="med" len="med"/>
+                    </a:lnT>
+                    <a:lnB w="9525" cap="flat" cmpd="sng" algn="ctr">
+                      <a:solidFill>
+                        <a:srgbClr val="DFE2E5"/>
+                      </a:solidFill>
+                      <a:prstDash val="solid"/>
+                      <a:round/>
+                      <a:headEnd type="none" w="med" len="med"/>
+                      <a:tailEnd type="none" w="med" len="med"/>
+                    </a:lnB>
+                    <a:solidFill>
+                      <a:srgbClr val="25272A"/>
+                    </a:solidFill>
+                  </a:tcPr>
+                </a:tc>
+                <a:tc>
+                  <a:txBody>
+                    <a:bodyPr/>
+                    <a:lstStyle/>
+                    <a:p>
+                      <a:r>
+                        <a:rPr lang="en-US">
+                          <a:solidFill>
+                            <a:schemeClr val="bg1"/>
+                          </a:solidFill>
+                          <a:effectLst/>
+                        </a:rPr>
+                        <a:t>An Effect should only use the effect creator (createEffect) or the Effect decorator (@Effect), but not both simultaneously</a:t>
+                      </a:r>
+                    </a:p>
+                  </a:txBody>
+                  <a:tcPr marL="123825" marR="123825" marT="57150" marB="57150" anchor="ctr">
+                    <a:lnL w="9525" cap="flat" cmpd="sng" algn="ctr">
+                      <a:solidFill>
+                        <a:srgbClr val="DFE2E5"/>
+                      </a:solidFill>
+                      <a:prstDash val="solid"/>
+                      <a:round/>
+                      <a:headEnd type="none" w="med" len="med"/>
+                      <a:tailEnd type="none" w="med" len="med"/>
+                    </a:lnL>
+                    <a:lnR w="9525" cap="flat" cmpd="sng" algn="ctr">
+                      <a:solidFill>
+                        <a:srgbClr val="DFE2E5"/>
+                      </a:solidFill>
+                      <a:prstDash val="solid"/>
+                      <a:round/>
+                      <a:headEnd type="none" w="med" len="med"/>
+                      <a:tailEnd type="none" w="med" len="med"/>
+                    </a:lnR>
+                    <a:lnT w="9525" cap="flat" cmpd="sng" algn="ctr">
+                      <a:solidFill>
+                        <a:srgbClr val="DFE2E5"/>
+                      </a:solidFill>
+                      <a:prstDash val="solid"/>
+                      <a:round/>
+                      <a:headEnd type="none" w="med" len="med"/>
+                      <a:tailEnd type="none" w="med" len="med"/>
+                    </a:lnT>
+                    <a:lnB w="9525" cap="flat" cmpd="sng" algn="ctr">
+                      <a:solidFill>
+                        <a:srgbClr val="DFE2E5"/>
+                      </a:solidFill>
+                      <a:prstDash val="solid"/>
+                      <a:round/>
+                      <a:headEnd type="none" w="med" len="med"/>
+                      <a:tailEnd type="none" w="med" len="med"/>
+                    </a:lnB>
+                    <a:solidFill>
+                      <a:srgbClr val="25272A"/>
+                    </a:solidFill>
+                  </a:tcPr>
+                </a:tc>
+              </a:tr>
+              <a:tr h="471489">
+                <a:tc>
+                  <a:txBody>
+                    <a:bodyPr/>
+                    <a:lstStyle/>
+                    <a:p>
+                      <a:r>
+                        <a:rPr lang="en-US" u="none" strike="noStrike" dirty="0" err="1" smtClean="0">
+                          <a:solidFill>
+                            <a:schemeClr val="bg1"/>
+                          </a:solidFill>
+                          <a:effectLst/>
+                        </a:rPr>
+                        <a:t>ngrx</a:t>
+                      </a:r>
+                      <a:r>
+                        <a:rPr lang="en-US" u="none" strike="noStrike" dirty="0" smtClean="0">
+                          <a:solidFill>
+                            <a:schemeClr val="bg1"/>
+                          </a:solidFill>
+                          <a:effectLst/>
+                        </a:rPr>
+                        <a:t>-no-duplicate-action-types</a:t>
+                      </a:r>
+                      <a:endParaRPr lang="en-US" dirty="0">
+                        <a:solidFill>
+                          <a:schemeClr val="bg1"/>
+                        </a:solidFill>
+                        <a:effectLst/>
+                      </a:endParaRPr>
+                    </a:p>
+                  </a:txBody>
+                  <a:tcPr marL="123825" marR="123825" marT="57150" marB="57150" anchor="ctr">
+                    <a:lnL w="9525" cap="flat" cmpd="sng" algn="ctr">
+                      <a:solidFill>
+                        <a:srgbClr val="DFE2E5"/>
+                      </a:solidFill>
+                      <a:prstDash val="solid"/>
+                      <a:round/>
+                      <a:headEnd type="none" w="med" len="med"/>
+                      <a:tailEnd type="none" w="med" len="med"/>
+                    </a:lnL>
+                    <a:lnR w="9525" cap="flat" cmpd="sng" algn="ctr">
+                      <a:solidFill>
+                        <a:srgbClr val="DFE2E5"/>
+                      </a:solidFill>
+                      <a:prstDash val="solid"/>
+                      <a:round/>
+                      <a:headEnd type="none" w="med" len="med"/>
+                      <a:tailEnd type="none" w="med" len="med"/>
+                    </a:lnR>
+                    <a:lnT w="9525" cap="flat" cmpd="sng" algn="ctr">
+                      <a:solidFill>
+                        <a:srgbClr val="DFE2E5"/>
+                      </a:solidFill>
+                      <a:prstDash val="solid"/>
+                      <a:round/>
+                      <a:headEnd type="none" w="med" len="med"/>
+                      <a:tailEnd type="none" w="med" len="med"/>
+                    </a:lnT>
+                    <a:lnB w="9525" cap="flat" cmpd="sng" algn="ctr">
+                      <a:solidFill>
+                        <a:srgbClr val="DFE2E5"/>
+                      </a:solidFill>
+                      <a:prstDash val="solid"/>
+                      <a:round/>
+                      <a:headEnd type="none" w="med" len="med"/>
+                      <a:tailEnd type="none" w="med" len="med"/>
+                    </a:lnB>
+                    <a:solidFill>
+                      <a:srgbClr val="141414"/>
+                    </a:solidFill>
+                  </a:tcPr>
+                </a:tc>
+                <a:tc>
+                  <a:txBody>
+                    <a:bodyPr/>
+                    <a:lstStyle/>
+                    <a:p>
+                      <a:r>
+                        <a:rPr lang="en-US">
+                          <a:solidFill>
+                            <a:schemeClr val="bg1"/>
+                          </a:solidFill>
+                          <a:effectLst/>
+                        </a:rPr>
+                        <a:t>An action type must be unique</a:t>
+                      </a:r>
+                    </a:p>
+                  </a:txBody>
+                  <a:tcPr marL="123825" marR="123825" marT="57150" marB="57150" anchor="ctr">
+                    <a:lnL w="9525" cap="flat" cmpd="sng" algn="ctr">
+                      <a:solidFill>
+                        <a:srgbClr val="DFE2E5"/>
+                      </a:solidFill>
+                      <a:prstDash val="solid"/>
+                      <a:round/>
+                      <a:headEnd type="none" w="med" len="med"/>
+                      <a:tailEnd type="none" w="med" len="med"/>
+                    </a:lnL>
+                    <a:lnR w="9525" cap="flat" cmpd="sng" algn="ctr">
+                      <a:solidFill>
+                        <a:srgbClr val="DFE2E5"/>
+                      </a:solidFill>
+                      <a:prstDash val="solid"/>
+                      <a:round/>
+                      <a:headEnd type="none" w="med" len="med"/>
+                      <a:tailEnd type="none" w="med" len="med"/>
+                    </a:lnR>
+                    <a:lnT w="9525" cap="flat" cmpd="sng" algn="ctr">
+                      <a:solidFill>
+                        <a:srgbClr val="DFE2E5"/>
+                      </a:solidFill>
+                      <a:prstDash val="solid"/>
+                      <a:round/>
+                      <a:headEnd type="none" w="med" len="med"/>
+                      <a:tailEnd type="none" w="med" len="med"/>
+                    </a:lnT>
+                    <a:lnB w="9525" cap="flat" cmpd="sng" algn="ctr">
+                      <a:solidFill>
+                        <a:srgbClr val="DFE2E5"/>
+                      </a:solidFill>
+                      <a:prstDash val="solid"/>
+                      <a:round/>
+                      <a:headEnd type="none" w="med" len="med"/>
+                      <a:tailEnd type="none" w="med" len="med"/>
+                    </a:lnB>
+                    <a:solidFill>
+                      <a:srgbClr val="141414"/>
+                    </a:solidFill>
+                  </a:tcPr>
+                </a:tc>
+              </a:tr>
+              <a:tr h="804306">
+                <a:tc>
+                  <a:txBody>
+                    <a:bodyPr/>
+                    <a:lstStyle/>
+                    <a:p>
+                      <a:r>
+                        <a:rPr lang="en-US" u="none" strike="noStrike" dirty="0" err="1" smtClean="0">
+                          <a:solidFill>
+                            <a:schemeClr val="bg1"/>
+                          </a:solidFill>
+                          <a:effectLst/>
+                        </a:rPr>
+                        <a:t>ngrx</a:t>
+                      </a:r>
+                      <a:r>
+                        <a:rPr lang="en-US" u="none" strike="noStrike" dirty="0" smtClean="0">
+                          <a:solidFill>
+                            <a:schemeClr val="bg1"/>
+                          </a:solidFill>
+                          <a:effectLst/>
+                        </a:rPr>
+                        <a:t>-unique-reducer-actions	</a:t>
+                      </a:r>
+                      <a:endParaRPr lang="en-US" dirty="0">
+                        <a:solidFill>
+                          <a:schemeClr val="bg1"/>
+                        </a:solidFill>
+                        <a:effectLst/>
+                      </a:endParaRPr>
+                    </a:p>
+                  </a:txBody>
+                  <a:tcPr marL="123825" marR="123825" marT="57150" marB="57150" anchor="ctr">
+                    <a:lnL w="9525" cap="flat" cmpd="sng" algn="ctr">
+                      <a:solidFill>
+                        <a:srgbClr val="DFE2E5"/>
+                      </a:solidFill>
+                      <a:prstDash val="solid"/>
+                      <a:round/>
+                      <a:headEnd type="none" w="med" len="med"/>
+                      <a:tailEnd type="none" w="med" len="med"/>
+                    </a:lnL>
+                    <a:lnR w="9525" cap="flat" cmpd="sng" algn="ctr">
+                      <a:solidFill>
+                        <a:srgbClr val="DFE2E5"/>
+                      </a:solidFill>
+                      <a:prstDash val="solid"/>
+                      <a:round/>
+                      <a:headEnd type="none" w="med" len="med"/>
+                      <a:tailEnd type="none" w="med" len="med"/>
+                    </a:lnR>
+                    <a:lnT w="9525" cap="flat" cmpd="sng" algn="ctr">
+                      <a:solidFill>
+                        <a:srgbClr val="DFE2E5"/>
+                      </a:solidFill>
+                      <a:prstDash val="solid"/>
+                      <a:round/>
+                      <a:headEnd type="none" w="med" len="med"/>
+                      <a:tailEnd type="none" w="med" len="med"/>
+                    </a:lnT>
+                    <a:lnB w="9525" cap="flat" cmpd="sng" algn="ctr">
+                      <a:solidFill>
+                        <a:srgbClr val="DFE2E5"/>
+                      </a:solidFill>
+                      <a:prstDash val="solid"/>
+                      <a:round/>
+                      <a:headEnd type="none" w="med" len="med"/>
+                      <a:tailEnd type="none" w="med" len="med"/>
+                    </a:lnB>
+                    <a:solidFill>
+                      <a:srgbClr val="25272A"/>
+                    </a:solidFill>
+                  </a:tcPr>
+                </a:tc>
+                <a:tc>
+                  <a:txBody>
+                    <a:bodyPr/>
+                    <a:lstStyle/>
+                    <a:p>
+                      <a:r>
+                        <a:rPr lang="en-US" dirty="0">
+                          <a:solidFill>
+                            <a:schemeClr val="bg1"/>
+                          </a:solidFill>
+                          <a:effectLst/>
+                        </a:rPr>
+                        <a:t>An action can't be handled multiple times in the same reducer</a:t>
+                      </a:r>
+                    </a:p>
+                  </a:txBody>
+                  <a:tcPr marL="123825" marR="123825" marT="57150" marB="57150" anchor="ctr">
+                    <a:lnL w="9525" cap="flat" cmpd="sng" algn="ctr">
+                      <a:solidFill>
+                        <a:srgbClr val="DFE2E5"/>
+                      </a:solidFill>
+                      <a:prstDash val="solid"/>
+                      <a:round/>
+                      <a:headEnd type="none" w="med" len="med"/>
+                      <a:tailEnd type="none" w="med" len="med"/>
+                    </a:lnL>
+                    <a:lnR w="9525" cap="flat" cmpd="sng" algn="ctr">
+                      <a:solidFill>
+                        <a:srgbClr val="DFE2E5"/>
+                      </a:solidFill>
+                      <a:prstDash val="solid"/>
+                      <a:round/>
+                      <a:headEnd type="none" w="med" len="med"/>
+                      <a:tailEnd type="none" w="med" len="med"/>
+                    </a:lnR>
+                    <a:lnT w="9525" cap="flat" cmpd="sng" algn="ctr">
+                      <a:solidFill>
+                        <a:srgbClr val="DFE2E5"/>
+                      </a:solidFill>
+                      <a:prstDash val="solid"/>
+                      <a:round/>
+                      <a:headEnd type="none" w="med" len="med"/>
+                      <a:tailEnd type="none" w="med" len="med"/>
+                    </a:lnT>
+                    <a:lnB w="9525" cap="flat" cmpd="sng" algn="ctr">
+                      <a:solidFill>
+                        <a:srgbClr val="DFE2E5"/>
+                      </a:solidFill>
+                      <a:prstDash val="solid"/>
+                      <a:round/>
+                      <a:headEnd type="none" w="med" len="med"/>
+                      <a:tailEnd type="none" w="med" len="med"/>
+                    </a:lnB>
+                    <a:solidFill>
+                      <a:srgbClr val="25272A"/>
+                    </a:solidFill>
+                  </a:tcPr>
+                </a:tc>
+              </a:tr>
+            </a:tbl>
+          </a:graphicData>
+        </a:graphic>
+      </p:graphicFrame>
+    </p:spTree>
+    <p:extLst>
+      <p:ext uri="{BB962C8B-B14F-4D97-AF65-F5344CB8AC3E}">
+        <p14:creationId xmlns:p14="http://schemas.microsoft.com/office/powerpoint/2010/main" val="1592367045"/>
+      </p:ext>
+    </p:extLst>
+  </p:cSld>
+  <p:clrMapOvr>
+    <a:masterClrMapping/>
+  </p:clrMapOvr>
+  <p:timing>
+    <p:tnLst>
+      <p:par>
+        <p:cTn id="1" dur="indefinite" restart="never" nodeType="tmRoot"/>
+      </p:par>
+    </p:tnLst>
+  </p:timing>
 </p:sld>
 </file>
 
@@ -6400,7 +7210,12 @@
             <p:ph type="title"/>
           </p:nvPr>
         </p:nvSpPr>
-        <p:spPr/>
+        <p:spPr>
+          <a:xfrm>
+            <a:off x="1484310" y="159589"/>
+            <a:ext cx="10018713" cy="1752599"/>
+          </a:xfrm>
+        </p:spPr>
         <p:txBody>
           <a:bodyPr>
             <a:normAutofit/>
@@ -6431,7 +7246,12 @@
             <p:ph idx="1"/>
           </p:nvPr>
         </p:nvSpPr>
-        <p:spPr/>
+        <p:spPr>
+          <a:xfrm>
+            <a:off x="1484310" y="2468591"/>
+            <a:ext cx="10018713" cy="3124201"/>
+          </a:xfrm>
+        </p:spPr>
         <p:txBody>
           <a:bodyPr>
             <a:noAutofit/>
@@ -6479,8 +7299,55 @@
                 <a:latin typeface="Times New Roman" panose="02020603050405020304" pitchFamily="18" charset="0"/>
                 <a:cs typeface="Times New Roman" panose="02020603050405020304" pitchFamily="18" charset="0"/>
               </a:rPr>
-              <a:t>NGRX Entity, NGRX Effects, NGRX Router Store, NGRX schematic</a:t>
-            </a:r>
+              <a:t>NGRX Entity, NGRX Effects, NGRX Router Store, NGRX </a:t>
+            </a:r>
+            <a:r>
+              <a:rPr lang="nl-NL" sz="2600" dirty="0" smtClean="0">
+                <a:latin typeface="Times New Roman" panose="02020603050405020304" pitchFamily="18" charset="0"/>
+                <a:cs typeface="Times New Roman" panose="02020603050405020304" pitchFamily="18" charset="0"/>
+              </a:rPr>
+              <a:t>schematic</a:t>
+            </a:r>
+          </a:p>
+          <a:p>
+            <a:r>
+              <a:rPr lang="en-US" sz="2800" dirty="0">
+                <a:latin typeface="Times New Roman" panose="02020603050405020304" pitchFamily="18" charset="0"/>
+                <a:cs typeface="Times New Roman" panose="02020603050405020304" pitchFamily="18" charset="0"/>
+              </a:rPr>
+              <a:t>What is good action hygiene ?</a:t>
+            </a:r>
+            <a:endParaRPr lang="nl-NL" sz="2600" dirty="0" smtClean="0">
+              <a:latin typeface="Times New Roman" panose="02020603050405020304" pitchFamily="18" charset="0"/>
+              <a:cs typeface="Times New Roman" panose="02020603050405020304" pitchFamily="18" charset="0"/>
+            </a:endParaRPr>
+          </a:p>
+          <a:p>
+            <a:r>
+              <a:rPr lang="en-US" sz="2800" dirty="0" err="1">
+                <a:latin typeface="Times New Roman" panose="02020603050405020304" pitchFamily="18" charset="0"/>
+                <a:cs typeface="Times New Roman" panose="02020603050405020304" pitchFamily="18" charset="0"/>
+              </a:rPr>
+              <a:t>TSLint</a:t>
+            </a:r>
+            <a:r>
+              <a:rPr lang="en-US" sz="2800" dirty="0">
+                <a:latin typeface="Times New Roman" panose="02020603050405020304" pitchFamily="18" charset="0"/>
+                <a:cs typeface="Times New Roman" panose="02020603050405020304" pitchFamily="18" charset="0"/>
+              </a:rPr>
+              <a:t> rules for </a:t>
+            </a:r>
+            <a:r>
+              <a:rPr lang="en-US" sz="2800" dirty="0" err="1">
+                <a:latin typeface="Times New Roman" panose="02020603050405020304" pitchFamily="18" charset="0"/>
+                <a:cs typeface="Times New Roman" panose="02020603050405020304" pitchFamily="18" charset="0"/>
+              </a:rPr>
+              <a:t>NgRx</a:t>
+            </a:r>
+            <a:endParaRPr lang="nl-NL" sz="2600" dirty="0">
+              <a:latin typeface="Times New Roman" panose="02020603050405020304" pitchFamily="18" charset="0"/>
+              <a:cs typeface="Times New Roman" panose="02020603050405020304" pitchFamily="18" charset="0"/>
+            </a:endParaRPr>
           </a:p>
           <a:p>
             <a:r>
@@ -6507,6 +7374,13 @@
   <p:clrMapOvr>
     <a:masterClrMapping/>
   </p:clrMapOvr>
+  <p:timing>
+    <p:tnLst>
+      <p:par>
+        <p:cTn id="1" dur="indefinite" restart="never" nodeType="tmRoot"/>
+      </p:par>
+    </p:tnLst>
+  </p:timing>
 </p:sld>
 </file>
 
@@ -6662,6 +7536,13 @@
   <p:clrMapOvr>
     <a:masterClrMapping/>
   </p:clrMapOvr>
+  <p:timing>
+    <p:tnLst>
+      <p:par>
+        <p:cTn id="1" dur="indefinite" restart="never" nodeType="tmRoot"/>
+      </p:par>
+    </p:tnLst>
+  </p:timing>
 </p:sld>
 </file>
 
@@ -6889,7 +7770,7 @@
           <p:cNvPr id="2" name="Title 1">
             <a:extLst>
               <a:ext uri="{FF2B5EF4-FFF2-40B4-BE49-F238E27FC236}">
-                <a16:creationId xmlns:a16="http://schemas.microsoft.com/office/drawing/2014/main" id="{07C7A6B9-44CD-4005-B425-780CFD49D720}"/>
+                <a16:creationId xmlns:a16="http://schemas.microsoft.com/office/drawing/2014/main" xmlns="" id="{07C7A6B9-44CD-4005-B425-780CFD49D720}"/>
               </a:ext>
             </a:extLst>
           </p:cNvPr>
@@ -6929,7 +7810,7 @@
           <p:cNvPr id="3" name="Content Placeholder 2">
             <a:extLst>
               <a:ext uri="{FF2B5EF4-FFF2-40B4-BE49-F238E27FC236}">
-                <a16:creationId xmlns:a16="http://schemas.microsoft.com/office/drawing/2014/main" id="{25B7DE74-9C22-4E3E-A52E-4A2C719479CD}"/>
+                <a16:creationId xmlns:a16="http://schemas.microsoft.com/office/drawing/2014/main" xmlns="" id="{25B7DE74-9C22-4E3E-A52E-4A2C719479CD}"/>
               </a:ext>
             </a:extLst>
           </p:cNvPr>
@@ -7133,7 +8014,7 @@
           <p:cNvPr id="2" name="Title 1">
             <a:extLst>
               <a:ext uri="{FF2B5EF4-FFF2-40B4-BE49-F238E27FC236}">
-                <a16:creationId xmlns:a16="http://schemas.microsoft.com/office/drawing/2014/main" id="{B8C01D79-5424-4894-9A57-61387EEF3791}"/>
+                <a16:creationId xmlns:a16="http://schemas.microsoft.com/office/drawing/2014/main" xmlns="" id="{B8C01D79-5424-4894-9A57-61387EEF3791}"/>
               </a:ext>
             </a:extLst>
           </p:cNvPr>
@@ -7167,7 +8048,7 @@
           <p:cNvPr id="3" name="Content Placeholder 2">
             <a:extLst>
               <a:ext uri="{FF2B5EF4-FFF2-40B4-BE49-F238E27FC236}">
-                <a16:creationId xmlns:a16="http://schemas.microsoft.com/office/drawing/2014/main" id="{80654262-D706-4D8D-87D7-4A78C22A48AB}"/>
+                <a16:creationId xmlns:a16="http://schemas.microsoft.com/office/drawing/2014/main" xmlns="" id="{80654262-D706-4D8D-87D7-4A78C22A48AB}"/>
               </a:ext>
             </a:extLst>
           </p:cNvPr>
@@ -7277,7 +8158,7 @@
           <p:cNvPr id="2" name="Title 1">
             <a:extLst>
               <a:ext uri="{FF2B5EF4-FFF2-40B4-BE49-F238E27FC236}">
-                <a16:creationId xmlns:a16="http://schemas.microsoft.com/office/drawing/2014/main" id="{761C03C4-E935-4D14-BE7D-F4D1992542D9}"/>
+                <a16:creationId xmlns:a16="http://schemas.microsoft.com/office/drawing/2014/main" xmlns="" id="{761C03C4-E935-4D14-BE7D-F4D1992542D9}"/>
               </a:ext>
             </a:extLst>
           </p:cNvPr>
@@ -7311,7 +8192,7 @@
           <p:cNvPr id="3" name="Content Placeholder 2">
             <a:extLst>
               <a:ext uri="{FF2B5EF4-FFF2-40B4-BE49-F238E27FC236}">
-                <a16:creationId xmlns:a16="http://schemas.microsoft.com/office/drawing/2014/main" id="{D7215419-52F9-4945-BF64-96EB8E2E21BB}"/>
+                <a16:creationId xmlns:a16="http://schemas.microsoft.com/office/drawing/2014/main" xmlns="" id="{D7215419-52F9-4945-BF64-96EB8E2E21BB}"/>
               </a:ext>
             </a:extLst>
           </p:cNvPr>
@@ -7455,7 +8336,7 @@
           <p:cNvPr id="2" name="Title 1">
             <a:extLst>
               <a:ext uri="{FF2B5EF4-FFF2-40B4-BE49-F238E27FC236}">
-                <a16:creationId xmlns:a16="http://schemas.microsoft.com/office/drawing/2014/main" id="{FEFDA24B-C3E5-4CA7-9698-467B600E9E4D}"/>
+                <a16:creationId xmlns:a16="http://schemas.microsoft.com/office/drawing/2014/main" xmlns="" id="{FEFDA24B-C3E5-4CA7-9698-467B600E9E4D}"/>
               </a:ext>
             </a:extLst>
           </p:cNvPr>
@@ -7489,7 +8370,7 @@
           <p:cNvPr id="3" name="Content Placeholder 2">
             <a:extLst>
               <a:ext uri="{FF2B5EF4-FFF2-40B4-BE49-F238E27FC236}">
-                <a16:creationId xmlns:a16="http://schemas.microsoft.com/office/drawing/2014/main" id="{8CB91232-1065-45D1-9C70-C2E53BDC329B}"/>
+                <a16:creationId xmlns:a16="http://schemas.microsoft.com/office/drawing/2014/main" xmlns="" id="{8CB91232-1065-45D1-9C70-C2E53BDC329B}"/>
               </a:ext>
             </a:extLst>
           </p:cNvPr>

</xml_diff>